<commit_message>
Final updates to February refresh
</commit_message>
<xml_diff>
--- a/Content/High-Performance Computing/Azure High-Performance Computing.pptx
+++ b/Content/High-Performance Computing/Azure High-Performance Computing.pptx
@@ -204,7 +204,7 @@
           <a:p>
             <a:fld id="{2E5CA586-3557-4985-BCD4-35EF5AC8B4A4}" type="datetimeFigureOut">
               <a:rPr lang="en-US" smtClean="0"/>
-              <a:t>2/8/2016</a:t>
+              <a:t>2/9/2016</a:t>
             </a:fld>
             <a:endParaRPr lang="en-US"/>
           </a:p>
@@ -11827,7 +11827,6 @@
               <a:rPr lang="en-US" dirty="0" smtClean="0"/>
               <a:t>)</a:t>
             </a:r>
-            <a:endParaRPr lang="en-US" dirty="0" smtClean="0"/>
           </a:p>
           <a:p>
             <a:endParaRPr lang="en-US" dirty="0"/>
@@ -14309,17 +14308,7 @@
                 <a:latin typeface="Segoe UI Light" panose="020B0502040204020203" pitchFamily="34" charset="0"/>
                 <a:cs typeface="Segoe UI Light" panose="020B0502040204020203" pitchFamily="34" charset="0"/>
               </a:rPr>
-              <a:t>See </a:t>
-            </a:r>
-            <a:r>
-              <a:rPr lang="en-US" sz="3200" dirty="0">
-                <a:solidFill>
-                  <a:schemeClr val="accent1"/>
-                </a:solidFill>
-                <a:latin typeface="Segoe UI Light" panose="020B0502040204020203" pitchFamily="34" charset="0"/>
-                <a:cs typeface="Segoe UI Light" panose="020B0502040204020203" pitchFamily="34" charset="0"/>
-              </a:rPr>
-              <a:t>http://bit.ly/a4r-vm-pricing for </a:t>
+              <a:t>See http://bit.ly/a4r-vm-pricing for </a:t>
             </a:r>
             <a:r>
               <a:rPr lang="en-US" sz="3200" dirty="0" smtClean="0">
@@ -14458,25 +14447,16 @@
             <a:endParaRPr lang="en-US" dirty="0" smtClean="0"/>
           </a:p>
           <a:p>
+            <a:r>
+              <a:rPr lang="en-US" dirty="0" smtClean="0"/>
+              <a:t>Allows resources to be collated into resource groups</a:t>
+            </a:r>
+          </a:p>
+          <a:p>
             <a:pPr lvl="1"/>
             <a:r>
               <a:rPr lang="en-US" dirty="0" smtClean="0"/>
-              <a:t>Allows </a:t>
-            </a:r>
-            <a:r>
-              <a:rPr lang="en-US" dirty="0" smtClean="0"/>
-              <a:t>resources to be collated into resource groups</a:t>
-            </a:r>
-          </a:p>
-          <a:p>
-            <a:pPr lvl="1"/>
-            <a:r>
-              <a:rPr lang="en-US" dirty="0" smtClean="0"/>
-              <a:t>Deploy</a:t>
-            </a:r>
-            <a:r>
-              <a:rPr lang="en-US" dirty="0" smtClean="0"/>
-              <a:t>, manage, monitor, and delete all resources at once rather than one resource at a time</a:t>
+              <a:t>Deploy, manage, monitor, and delete all resources at once rather than one resource at a time</a:t>
             </a:r>
             <a:endParaRPr lang="en-US" dirty="0"/>
           </a:p>
@@ -14599,11 +14579,7 @@
           <a:p>
             <a:r>
               <a:rPr lang="en-US" dirty="0" smtClean="0"/>
-              <a:t>Find them </a:t>
-            </a:r>
-            <a:r>
-              <a:rPr lang="en-US" dirty="0" smtClean="0"/>
-              <a:t>on the Azure site </a:t>
+              <a:t>Find them on the Azure site </a:t>
             </a:r>
             <a:r>
               <a:rPr lang="en-US" dirty="0"/>
@@ -14625,7 +14601,6 @@
               <a:rPr lang="en-US" dirty="0" smtClean="0"/>
               <a:t>)</a:t>
             </a:r>
-            <a:endParaRPr lang="en-US" dirty="0" smtClean="0"/>
           </a:p>
           <a:p>
             <a:r>
@@ -14652,7 +14627,6 @@
               <a:rPr lang="en-US" dirty="0" smtClean="0"/>
               <a:t>)</a:t>
             </a:r>
-            <a:endParaRPr lang="en-US" dirty="0" smtClean="0"/>
           </a:p>
         </p:txBody>
       </p:sp>
@@ -14851,11 +14825,7 @@
             </a:r>
             <a:r>
               <a:rPr lang="en-US" dirty="0" smtClean="0"/>
-              <a:t> enables </a:t>
-            </a:r>
-            <a:r>
-              <a:rPr lang="en-US" dirty="0" smtClean="0"/>
-              <a:t>easy deployment of SLURM clusters of user-specified sizes</a:t>
+              <a:t> enables easy deployment of SLURM clusters of user-specified sizes</a:t>
             </a:r>
             <a:endParaRPr lang="en-US" dirty="0"/>
           </a:p>

</xml_diff>